<commit_message>
make 3 runs (w self-paced break after each run), 1 run = 10 blocks(4x40, 3x20, 3X10 trials)
</commit_message>
<xml_diff>
--- a/instructions-to-be-modified/instructions_v1.pptx
+++ b/instructions-to-be-modified/instructions_v1.pptx
@@ -113,7 +113,18 @@
   </p:defaultTextStyle>
   <p:extLst>
     <p:ext uri="{EFAFB233-063F-42B5-8137-9DF3F51BA10A}">
-      <p15:sldGuideLst xmlns:p15="http://schemas.microsoft.com/office/powerpoint/2012/main" xmlns=""/>
+      <p15:sldGuideLst xmlns:p15="http://schemas.microsoft.com/office/powerpoint/2012/main">
+        <p15:guide id="1" orient="horz" pos="2160">
+          <p15:clr>
+            <a:srgbClr val="A4A3A4"/>
+          </p15:clr>
+        </p15:guide>
+        <p15:guide id="2" pos="3840">
+          <p15:clr>
+            <a:srgbClr val="A4A3A4"/>
+          </p15:clr>
+        </p15:guide>
+      </p15:sldGuideLst>
     </p:ext>
   </p:extLst>
 </p:presentation>
@@ -292,7 +303,7 @@
           <a:p>
             <a:fld id="{3F9CA74D-85C6-4EF7-A40A-A4BDBBA5BAF7}" type="slidenum">
               <a:rPr lang="it-IT" smtClean="0"/>
-              <a:t>‹N°›</a:t>
+              <a:t>‹#›</a:t>
             </a:fld>
             <a:endParaRPr lang="it-IT"/>
           </a:p>
@@ -462,7 +473,7 @@
           <a:p>
             <a:fld id="{3F9CA74D-85C6-4EF7-A40A-A4BDBBA5BAF7}" type="slidenum">
               <a:rPr lang="it-IT" smtClean="0"/>
-              <a:t>‹N°›</a:t>
+              <a:t>‹#›</a:t>
             </a:fld>
             <a:endParaRPr lang="it-IT"/>
           </a:p>
@@ -642,7 +653,7 @@
           <a:p>
             <a:fld id="{3F9CA74D-85C6-4EF7-A40A-A4BDBBA5BAF7}" type="slidenum">
               <a:rPr lang="it-IT" smtClean="0"/>
-              <a:t>‹N°›</a:t>
+              <a:t>‹#›</a:t>
             </a:fld>
             <a:endParaRPr lang="it-IT"/>
           </a:p>
@@ -812,7 +823,7 @@
           <a:p>
             <a:fld id="{3F9CA74D-85C6-4EF7-A40A-A4BDBBA5BAF7}" type="slidenum">
               <a:rPr lang="it-IT" smtClean="0"/>
-              <a:t>‹N°›</a:t>
+              <a:t>‹#›</a:t>
             </a:fld>
             <a:endParaRPr lang="it-IT"/>
           </a:p>
@@ -1058,7 +1069,7 @@
           <a:p>
             <a:fld id="{3F9CA74D-85C6-4EF7-A40A-A4BDBBA5BAF7}" type="slidenum">
               <a:rPr lang="it-IT" smtClean="0"/>
-              <a:t>‹N°›</a:t>
+              <a:t>‹#›</a:t>
             </a:fld>
             <a:endParaRPr lang="it-IT"/>
           </a:p>
@@ -1290,7 +1301,7 @@
           <a:p>
             <a:fld id="{3F9CA74D-85C6-4EF7-A40A-A4BDBBA5BAF7}" type="slidenum">
               <a:rPr lang="it-IT" smtClean="0"/>
-              <a:t>‹N°›</a:t>
+              <a:t>‹#›</a:t>
             </a:fld>
             <a:endParaRPr lang="it-IT"/>
           </a:p>
@@ -1657,7 +1668,7 @@
           <a:p>
             <a:fld id="{3F9CA74D-85C6-4EF7-A40A-A4BDBBA5BAF7}" type="slidenum">
               <a:rPr lang="it-IT" smtClean="0"/>
-              <a:t>‹N°›</a:t>
+              <a:t>‹#›</a:t>
             </a:fld>
             <a:endParaRPr lang="it-IT"/>
           </a:p>
@@ -1775,7 +1786,7 @@
           <a:p>
             <a:fld id="{3F9CA74D-85C6-4EF7-A40A-A4BDBBA5BAF7}" type="slidenum">
               <a:rPr lang="it-IT" smtClean="0"/>
-              <a:t>‹N°›</a:t>
+              <a:t>‹#›</a:t>
             </a:fld>
             <a:endParaRPr lang="it-IT"/>
           </a:p>
@@ -1870,7 +1881,7 @@
           <a:p>
             <a:fld id="{3F9CA74D-85C6-4EF7-A40A-A4BDBBA5BAF7}" type="slidenum">
               <a:rPr lang="it-IT" smtClean="0"/>
-              <a:t>‹N°›</a:t>
+              <a:t>‹#›</a:t>
             </a:fld>
             <a:endParaRPr lang="it-IT"/>
           </a:p>
@@ -2147,7 +2158,7 @@
           <a:p>
             <a:fld id="{3F9CA74D-85C6-4EF7-A40A-A4BDBBA5BAF7}" type="slidenum">
               <a:rPr lang="it-IT" smtClean="0"/>
-              <a:t>‹N°›</a:t>
+              <a:t>‹#›</a:t>
             </a:fld>
             <a:endParaRPr lang="it-IT"/>
           </a:p>
@@ -2400,7 +2411,7 @@
           <a:p>
             <a:fld id="{3F9CA74D-85C6-4EF7-A40A-A4BDBBA5BAF7}" type="slidenum">
               <a:rPr lang="it-IT" smtClean="0"/>
-              <a:t>‹N°›</a:t>
+              <a:t>‹#›</a:t>
             </a:fld>
             <a:endParaRPr lang="it-IT"/>
           </a:p>
@@ -2649,7 +2660,7 @@
           <a:p>
             <a:fld id="{3F9CA74D-85C6-4EF7-A40A-A4BDBBA5BAF7}" type="slidenum">
               <a:rPr lang="it-IT" smtClean="0"/>
-              <a:t>‹N°›</a:t>
+              <a:t>‹#›</a:t>
             </a:fld>
             <a:endParaRPr lang="it-IT"/>
           </a:p>
@@ -4268,15 +4279,7 @@
                   <a:schemeClr val="bg1"/>
                 </a:solidFill>
               </a:rPr>
-              <a:t>In seguito, una </a:t>
-            </a:r>
-            <a:r>
-              <a:rPr lang="it-IT" dirty="0" smtClean="0">
-                <a:solidFill>
-                  <a:schemeClr val="bg1"/>
-                </a:solidFill>
-              </a:rPr>
-              <a:t>faccina sorridente indicherà che la partita nella quale hai deciso di fare partecipare o meno il giocatore è stata </a:t>
+              <a:t>In seguito, una faccina sorridente indicherà che la partita nella quale hai deciso di fare partecipare o meno il giocatore è stata </a:t>
             </a:r>
             <a:r>
               <a:rPr lang="it-IT" b="1" u="sng" dirty="0" smtClean="0">
@@ -4292,15 +4295,7 @@
                   <a:schemeClr val="bg1"/>
                 </a:solidFill>
               </a:rPr>
-              <a:t>, mentre una </a:t>
-            </a:r>
-            <a:r>
-              <a:rPr lang="it-IT" dirty="0" smtClean="0">
-                <a:solidFill>
-                  <a:schemeClr val="bg1"/>
-                </a:solidFill>
-              </a:rPr>
-              <a:t>faccina triste indicherà che la partita è stata </a:t>
+              <a:t>, mentre una faccina triste indicherà che la partita è stata </a:t>
             </a:r>
             <a:r>
               <a:rPr lang="it-IT" b="1" u="sng" dirty="0" smtClean="0">
@@ -4886,15 +4881,7 @@
                   <a:schemeClr val="bg1"/>
                 </a:solidFill>
               </a:rPr>
-              <a:t>Se </a:t>
-            </a:r>
-            <a:r>
-              <a:rPr lang="it-IT" dirty="0" smtClean="0">
-                <a:solidFill>
-                  <a:schemeClr val="bg1"/>
-                </a:solidFill>
-              </a:rPr>
-              <a:t>non scegli abbastanza in fretta, comparirà un punto di domanda.</a:t>
+              <a:t>Se non scegli abbastanza in fretta, comparirà un punto di domanda.</a:t>
             </a:r>
             <a:endParaRPr lang="it-IT" dirty="0">
               <a:solidFill>
@@ -5384,29 +5371,8 @@
                   <a:schemeClr val="bg1"/>
                 </a:solidFill>
               </a:rPr>
-              <a:t>Attenzione: la </a:t>
-            </a:r>
-            <a:r>
-              <a:rPr lang="it-IT" dirty="0" smtClean="0">
-                <a:solidFill>
-                  <a:schemeClr val="bg1"/>
-                </a:solidFill>
-              </a:rPr>
-              <a:t>posizione dei tasti «Gioca» e «Non giocare» potrà </a:t>
-            </a:r>
-            <a:r>
-              <a:rPr lang="it-IT" dirty="0" smtClean="0">
-                <a:solidFill>
-                  <a:schemeClr val="bg1"/>
-                </a:solidFill>
-              </a:rPr>
-              <a:t>variare tra un giocatore e l’altro.</a:t>
-            </a:r>
-            <a:endParaRPr lang="it-IT" dirty="0" smtClean="0">
-              <a:solidFill>
-                <a:schemeClr val="bg1"/>
-              </a:solidFill>
-            </a:endParaRPr>
+              <a:t>Attenzione: la posizione dei tasti «Gioca» e «Non giocare» potrà variare tra un giocatore e l’altro.</a:t>
+            </a:r>
           </a:p>
           <a:p>
             <a:pPr algn="l"/>
@@ -6330,12 +6296,12 @@
         <p:spPr>
           <a:xfrm>
             <a:off x="885825" y="2363787"/>
-            <a:ext cx="10696575" cy="2398713"/>
+            <a:ext cx="10696575" cy="3036349"/>
           </a:xfrm>
         </p:spPr>
         <p:txBody>
           <a:bodyPr>
-            <a:normAutofit fontScale="92500" lnSpcReduction="10000"/>
+            <a:normAutofit/>
           </a:bodyPr>
           <a:lstStyle/>
           <a:p>
@@ -6346,15 +6312,7 @@
                   <a:schemeClr val="bg1"/>
                 </a:solidFill>
               </a:rPr>
-              <a:t>Dopo aver simulato un certo numero di partite, ti verrà chiesto di giudicare l’impatto del giocatore sulla tua squadra con un </a:t>
-            </a:r>
-            <a:r>
-              <a:rPr lang="it-IT" dirty="0" smtClean="0">
-                <a:solidFill>
-                  <a:schemeClr val="bg1"/>
-                </a:solidFill>
-              </a:rPr>
-              <a:t>punteggio </a:t>
+              <a:t>Dopo aver simulato un certo numero di partite, ti verrà chiesto di giudicare l’impatto del giocatore sulla tua squadra con un punteggio </a:t>
             </a:r>
             <a:r>
               <a:rPr lang="it-IT" b="1" u="sng" dirty="0" smtClean="0">
@@ -6370,42 +6328,18 @@
                   <a:schemeClr val="bg1"/>
                 </a:solidFill>
               </a:rPr>
-              <a:t> tra </a:t>
-            </a:r>
+              <a:t> tra -100 a 100.</a:t>
+            </a:r>
+          </a:p>
+          <a:p>
+            <a:pPr algn="l"/>
             <a:r>
               <a:rPr lang="it-IT" dirty="0" smtClean="0">
                 <a:solidFill>
                   <a:schemeClr val="bg1"/>
                 </a:solidFill>
               </a:rPr>
-              <a:t>-100 a 100</a:t>
-            </a:r>
-            <a:r>
-              <a:rPr lang="it-IT" dirty="0" smtClean="0">
-                <a:solidFill>
-                  <a:schemeClr val="bg1"/>
-                </a:solidFill>
-              </a:rPr>
-              <a:t>.</a:t>
-            </a:r>
-          </a:p>
-          <a:p>
-            <a:pPr algn="l"/>
-            <a:r>
-              <a:rPr lang="it-IT" dirty="0" smtClean="0">
-                <a:solidFill>
-                  <a:schemeClr val="bg1"/>
-                </a:solidFill>
-              </a:rPr>
-              <a:t>Ad </a:t>
-            </a:r>
-            <a:r>
-              <a:rPr lang="it-IT" dirty="0" smtClean="0">
-                <a:solidFill>
-                  <a:schemeClr val="bg1"/>
-                </a:solidFill>
-              </a:rPr>
-              <a:t>esempio</a:t>
+              <a:t>Ad esempio</a:t>
             </a:r>
             <a:r>
               <a:rPr lang="it-IT" dirty="0" smtClean="0">
@@ -6429,149 +6363,30 @@
                   <a:schemeClr val="bg1"/>
                 </a:solidFill>
               </a:rPr>
-              <a:t>	100 </a:t>
-            </a:r>
+              <a:t>	100 : «Il giocatore fa sempre vincere la squadra»</a:t>
+            </a:r>
+          </a:p>
+          <a:p>
+            <a:pPr algn="l"/>
             <a:r>
               <a:rPr lang="it-IT" dirty="0" smtClean="0">
                 <a:solidFill>
                   <a:schemeClr val="bg1"/>
                 </a:solidFill>
               </a:rPr>
-              <a:t>: </a:t>
-            </a:r>
+              <a:t>	0 : «Il giocatore non ha alcun impatto sulla performance della squadra»</a:t>
+            </a:r>
+          </a:p>
+          <a:p>
+            <a:pPr algn="l"/>
             <a:r>
               <a:rPr lang="it-IT" dirty="0" smtClean="0">
                 <a:solidFill>
                   <a:schemeClr val="bg1"/>
                 </a:solidFill>
               </a:rPr>
-              <a:t>«Il </a:t>
-            </a:r>
-            <a:r>
-              <a:rPr lang="it-IT" dirty="0" smtClean="0">
-                <a:solidFill>
-                  <a:schemeClr val="bg1"/>
-                </a:solidFill>
-              </a:rPr>
-              <a:t>giocatore fa sempre vincere la </a:t>
-            </a:r>
-            <a:r>
-              <a:rPr lang="it-IT" dirty="0" smtClean="0">
-                <a:solidFill>
-                  <a:schemeClr val="bg1"/>
-                </a:solidFill>
-              </a:rPr>
-              <a:t>squadra»</a:t>
-            </a:r>
-            <a:endParaRPr lang="it-IT" dirty="0" smtClean="0">
-              <a:solidFill>
-                <a:schemeClr val="bg1"/>
-              </a:solidFill>
-            </a:endParaRPr>
-          </a:p>
-          <a:p>
-            <a:pPr algn="l"/>
-            <a:r>
-              <a:rPr lang="it-IT" dirty="0" smtClean="0">
-                <a:solidFill>
-                  <a:schemeClr val="bg1"/>
-                </a:solidFill>
-              </a:rPr>
-              <a:t>	0 </a:t>
-            </a:r>
-            <a:r>
-              <a:rPr lang="it-IT" dirty="0" smtClean="0">
-                <a:solidFill>
-                  <a:schemeClr val="bg1"/>
-                </a:solidFill>
-              </a:rPr>
-              <a:t>: </a:t>
-            </a:r>
-            <a:r>
-              <a:rPr lang="it-IT" dirty="0" smtClean="0">
-                <a:solidFill>
-                  <a:schemeClr val="bg1"/>
-                </a:solidFill>
-              </a:rPr>
-              <a:t>«Il </a:t>
-            </a:r>
-            <a:r>
-              <a:rPr lang="it-IT" dirty="0" smtClean="0">
-                <a:solidFill>
-                  <a:schemeClr val="bg1"/>
-                </a:solidFill>
-              </a:rPr>
-              <a:t>giocatore non ha alcun impatto sulla performance della </a:t>
-            </a:r>
-            <a:r>
-              <a:rPr lang="it-IT" dirty="0" smtClean="0">
-                <a:solidFill>
-                  <a:schemeClr val="bg1"/>
-                </a:solidFill>
-              </a:rPr>
-              <a:t>squadra»</a:t>
-            </a:r>
-            <a:endParaRPr lang="it-IT" dirty="0" smtClean="0">
-              <a:solidFill>
-                <a:schemeClr val="bg1"/>
-              </a:solidFill>
-            </a:endParaRPr>
-          </a:p>
-          <a:p>
-            <a:pPr algn="l"/>
-            <a:r>
-              <a:rPr lang="it-IT" dirty="0" smtClean="0">
-                <a:solidFill>
-                  <a:schemeClr val="bg1"/>
-                </a:solidFill>
-              </a:rPr>
-              <a:t>	- </a:t>
-            </a:r>
-            <a:r>
-              <a:rPr lang="it-IT" dirty="0" smtClean="0">
-                <a:solidFill>
-                  <a:schemeClr val="bg1"/>
-                </a:solidFill>
-              </a:rPr>
-              <a:t>100: </a:t>
-            </a:r>
-            <a:r>
-              <a:rPr lang="it-IT" dirty="0" smtClean="0">
-                <a:solidFill>
-                  <a:schemeClr val="bg1"/>
-                </a:solidFill>
-              </a:rPr>
-              <a:t>«Il </a:t>
-            </a:r>
-            <a:r>
-              <a:rPr lang="it-IT" dirty="0" smtClean="0">
-                <a:solidFill>
-                  <a:schemeClr val="bg1"/>
-                </a:solidFill>
-              </a:rPr>
-              <a:t>giocatore fa sempre perdere la </a:t>
-            </a:r>
-            <a:r>
-              <a:rPr lang="it-IT" dirty="0" smtClean="0">
-                <a:solidFill>
-                  <a:schemeClr val="bg1"/>
-                </a:solidFill>
-              </a:rPr>
-              <a:t>squadra</a:t>
-            </a:r>
-            <a:r>
-              <a:rPr lang="it-IT" dirty="0" smtClean="0">
-                <a:solidFill>
-                  <a:schemeClr val="bg1"/>
-                </a:solidFill>
-              </a:rPr>
-              <a:t>»</a:t>
-            </a:r>
-            <a:endParaRPr lang="it-IT" dirty="0" smtClean="0">
-              <a:solidFill>
-                <a:schemeClr val="bg1"/>
-              </a:solidFill>
-            </a:endParaRPr>
+              <a:t>	- 100: «Il giocatore fa sempre perdere la squadra»</a:t>
+            </a:r>
           </a:p>
           <a:p>
             <a:pPr algn="l"/>
@@ -6800,11 +6615,6 @@
               </a:rPr>
               <a:t>	</a:t>
             </a:r>
-            <a:endParaRPr lang="it-IT" dirty="0" smtClean="0">
-              <a:solidFill>
-                <a:schemeClr val="bg1"/>
-              </a:solidFill>
-            </a:endParaRPr>
           </a:p>
           <a:p>
             <a:endParaRPr lang="it-IT" dirty="0">
@@ -6962,7 +6772,7 @@
         </p:spPr>
         <p:txBody>
           <a:bodyPr>
-            <a:normAutofit fontScale="92500" lnSpcReduction="10000"/>
+            <a:normAutofit fontScale="92500" lnSpcReduction="20000"/>
           </a:bodyPr>
           <a:lstStyle/>
           <a:p>
@@ -7011,7 +6821,23 @@
                   <a:schemeClr val="bg1"/>
                 </a:solidFill>
               </a:rPr>
-              <a:t>In base a questo valore, oltre ai 10€ di gettone, potrai vincere fino a un </a:t>
+              <a:t>In base a questo </a:t>
+            </a:r>
+            <a:r>
+              <a:rPr lang="it-IT" dirty="0" smtClean="0">
+                <a:solidFill>
+                  <a:schemeClr val="bg1"/>
+                </a:solidFill>
+              </a:rPr>
+              <a:t>valore </a:t>
+            </a:r>
+            <a:r>
+              <a:rPr lang="it-IT" dirty="0" smtClean="0">
+                <a:solidFill>
+                  <a:schemeClr val="bg1"/>
+                </a:solidFill>
+              </a:rPr>
+              <a:t>potrai vincere fino a un </a:t>
             </a:r>
             <a:r>
               <a:rPr lang="it-IT" b="1" u="sng" dirty="0" smtClean="0">
@@ -7019,7 +6845,23 @@
                   <a:schemeClr val="bg1"/>
                 </a:solidFill>
               </a:rPr>
-              <a:t>massimo di 5€!</a:t>
+              <a:t>massimo di 5</a:t>
+            </a:r>
+            <a:r>
+              <a:rPr lang="it-IT" b="1" u="sng" dirty="0" smtClean="0">
+                <a:solidFill>
+                  <a:schemeClr val="bg1"/>
+                </a:solidFill>
+              </a:rPr>
+              <a:t>€,</a:t>
+            </a:r>
+            <a:r>
+              <a:rPr lang="it-IT" dirty="0" smtClean="0">
+                <a:solidFill>
+                  <a:schemeClr val="bg1"/>
+                </a:solidFill>
+              </a:rPr>
+              <a:t> che alla fine andranno sommati ai 10€ di gettone di presenza.</a:t>
             </a:r>
             <a:endParaRPr lang="it-IT" dirty="0">
               <a:solidFill>
@@ -7238,14 +7080,6 @@
             </a:lvl9pPr>
           </a:lstStyle>
           <a:p>
-            <a:r>
-              <a:rPr lang="it-IT" dirty="0" smtClean="0">
-                <a:solidFill>
-                  <a:schemeClr val="bg1"/>
-                </a:solidFill>
-              </a:rPr>
-              <a:t>	</a:t>
-            </a:r>
             <a:endParaRPr lang="it-IT" dirty="0" smtClean="0">
               <a:solidFill>
                 <a:schemeClr val="bg1"/>
@@ -8010,7 +7844,7 @@
   <a:extraClrSchemeLst/>
   <a:extLst>
     <a:ext uri="{05A4C25C-085E-4340-85A3-A5531E510DB2}">
-      <thm15:themeFamily xmlns:thm15="http://schemas.microsoft.com/office/thememl/2012/main" xmlns="" name="Office Theme" id="{62F939B6-93AF-4DB8-9C6B-D6C7DFDC589F}" vid="{4A3C46E8-61CC-4603-A589-7422A47A8E4A}"/>
+      <thm15:themeFamily xmlns:thm15="http://schemas.microsoft.com/office/thememl/2012/main" name="Office Theme" id="{62F939B6-93AF-4DB8-9C6B-D6C7DFDC589F}" vid="{4A3C46E8-61CC-4603-A589-7422A47A8E4A}"/>
     </a:ext>
   </a:extLst>
 </a:theme>

</xml_diff>